<commit_message>
add png and update pp
</commit_message>
<xml_diff>
--- a/Report/Taking Off.pptx
+++ b/Report/Taking Off.pptx
@@ -7,11 +7,14 @@
   <p:sldIdLst>
     <p:sldId id="257" r:id="rId2"/>
     <p:sldId id="261" r:id="rId3"/>
-    <p:sldId id="265" r:id="rId4"/>
-    <p:sldId id="260" r:id="rId5"/>
-    <p:sldId id="263" r:id="rId6"/>
-    <p:sldId id="262" r:id="rId7"/>
-    <p:sldId id="264" r:id="rId8"/>
+    <p:sldId id="266" r:id="rId4"/>
+    <p:sldId id="265" r:id="rId5"/>
+    <p:sldId id="260" r:id="rId6"/>
+    <p:sldId id="267" r:id="rId7"/>
+    <p:sldId id="263" r:id="rId8"/>
+    <p:sldId id="262" r:id="rId9"/>
+    <p:sldId id="264" r:id="rId10"/>
+    <p:sldId id="268" r:id="rId11"/>
   </p:sldIdLst>
   <p:sldSz cx="12192000" cy="6858000"/>
   <p:notesSz cx="6858000" cy="9144000"/>
@@ -4074,6 +4077,65 @@
 </p:sld>
 </file>
 
+<file path=ppt/slides/slide10.xml><?xml version="1.0" encoding="utf-8"?>
+<p:sld xmlns:a="http://schemas.openxmlformats.org/drawingml/2006/main" xmlns:r="http://schemas.openxmlformats.org/officeDocument/2006/relationships" xmlns:p="http://schemas.openxmlformats.org/presentationml/2006/main">
+  <p:cSld>
+    <p:spTree>
+      <p:nvGrpSpPr>
+        <p:cNvPr id="1" name=""/>
+        <p:cNvGrpSpPr/>
+        <p:nvPr/>
+      </p:nvGrpSpPr>
+      <p:grpSpPr>
+        <a:xfrm>
+          <a:off x="0" y="0"/>
+          <a:ext cx="0" cy="0"/>
+          <a:chOff x="0" y="0"/>
+          <a:chExt cx="0" cy="0"/>
+        </a:xfrm>
+      </p:grpSpPr>
+      <p:sp>
+        <p:nvSpPr>
+          <p:cNvPr id="2" name="Title 1">
+            <a:extLst>
+              <a:ext uri="{FF2B5EF4-FFF2-40B4-BE49-F238E27FC236}">
+                <a16:creationId xmlns:a16="http://schemas.microsoft.com/office/drawing/2014/main" id="{EB02781D-41FF-420A-A3BD-0A0010E15EA5}"/>
+              </a:ext>
+            </a:extLst>
+          </p:cNvPr>
+          <p:cNvSpPr>
+            <a:spLocks noGrp="1"/>
+          </p:cNvSpPr>
+          <p:nvPr>
+            <p:ph type="title"/>
+          </p:nvPr>
+        </p:nvSpPr>
+        <p:spPr/>
+        <p:txBody>
+          <a:bodyPr/>
+          <a:lstStyle/>
+          <a:p>
+            <a:pPr algn="ctr"/>
+            <a:r>
+              <a:rPr lang="en-US" dirty="0"/>
+              <a:t>What We Learned</a:t>
+            </a:r>
+          </a:p>
+        </p:txBody>
+      </p:sp>
+    </p:spTree>
+    <p:extLst>
+      <p:ext uri="{BB962C8B-B14F-4D97-AF65-F5344CB8AC3E}">
+        <p14:creationId xmlns:p14="http://schemas.microsoft.com/office/powerpoint/2010/main" val="1336803383"/>
+      </p:ext>
+    </p:extLst>
+  </p:cSld>
+  <p:clrMapOvr>
+    <a:masterClrMapping/>
+  </p:clrMapOvr>
+</p:sld>
+</file>
+
 <file path=ppt/slides/slide2.xml><?xml version="1.0" encoding="utf-8"?>
 <p:sld xmlns:a="http://schemas.openxmlformats.org/drawingml/2006/main" xmlns:r="http://schemas.openxmlformats.org/officeDocument/2006/relationships" xmlns:p="http://schemas.openxmlformats.org/presentationml/2006/main">
   <p:cSld>
@@ -4199,7 +4261,7 @@
           <p:cNvPr id="2" name="Title 1">
             <a:extLst>
               <a:ext uri="{FF2B5EF4-FFF2-40B4-BE49-F238E27FC236}">
-                <a16:creationId xmlns:a16="http://schemas.microsoft.com/office/drawing/2014/main" id="{EF12A194-F17B-4168-9418-35F4A913DD9B}"/>
+                <a16:creationId xmlns:a16="http://schemas.microsoft.com/office/drawing/2014/main" id="{0C6EFED1-B2BD-4214-84EE-3C25C3ADA60F}"/>
               </a:ext>
             </a:extLst>
           </p:cNvPr>
@@ -4218,17 +4280,17 @@
             <a:pPr algn="ctr"/>
             <a:r>
               <a:rPr lang="en-US" dirty="0"/>
-              <a:t>The Inspiration – Leaflet.js</a:t>
+              <a:t>The Data</a:t>
             </a:r>
           </a:p>
         </p:txBody>
       </p:sp>
       <p:pic>
         <p:nvPicPr>
-          <p:cNvPr id="4" name="Picture 3">
-            <a:extLst>
-              <a:ext uri="{FF2B5EF4-FFF2-40B4-BE49-F238E27FC236}">
-                <a16:creationId xmlns:a16="http://schemas.microsoft.com/office/drawing/2014/main" id="{B691D0C6-BF65-4436-B015-9F4D6898D57D}"/>
+          <p:cNvPr id="3" name="Picture 2">
+            <a:extLst>
+              <a:ext uri="{FF2B5EF4-FFF2-40B4-BE49-F238E27FC236}">
+                <a16:creationId xmlns:a16="http://schemas.microsoft.com/office/drawing/2014/main" id="{3D09206C-5CBA-4A4A-91FE-862A5CD92BBF}"/>
               </a:ext>
             </a:extLst>
           </p:cNvPr>
@@ -4238,21 +4300,15 @@
           <p:nvPr/>
         </p:nvPicPr>
         <p:blipFill>
-          <a:blip r:embed="rId2">
-            <a:extLst>
-              <a:ext uri="{28A0092B-C50C-407E-A947-70E740481C1C}">
-                <a14:useLocalDpi xmlns:a14="http://schemas.microsoft.com/office/drawing/2010/main" val="0"/>
-              </a:ext>
-            </a:extLst>
-          </a:blip>
+          <a:blip r:embed="rId2"/>
           <a:stretch>
             <a:fillRect/>
           </a:stretch>
         </p:blipFill>
         <p:spPr>
           <a:xfrm>
-            <a:off x="2855346" y="2080614"/>
-            <a:ext cx="5829343" cy="3881466"/>
+            <a:off x="611325" y="2116433"/>
+            <a:ext cx="11030309" cy="1048157"/>
           </a:xfrm>
           <a:prstGeom prst="rect">
             <a:avLst/>
@@ -4261,10 +4317,10 @@
       </p:pic>
       <p:sp>
         <p:nvSpPr>
-          <p:cNvPr id="5" name="TextBox 4">
-            <a:extLst>
-              <a:ext uri="{FF2B5EF4-FFF2-40B4-BE49-F238E27FC236}">
-                <a16:creationId xmlns:a16="http://schemas.microsoft.com/office/drawing/2014/main" id="{AE50F071-4736-4B62-AB3A-53168A9054A4}"/>
+          <p:cNvPr id="4" name="TextBox 3">
+            <a:extLst>
+              <a:ext uri="{FF2B5EF4-FFF2-40B4-BE49-F238E27FC236}">
+                <a16:creationId xmlns:a16="http://schemas.microsoft.com/office/drawing/2014/main" id="{D18718AA-A236-48C9-AF99-EF2375AD1063}"/>
               </a:ext>
             </a:extLst>
           </p:cNvPr>
@@ -4273,8 +4329,8 @@
         </p:nvSpPr>
         <p:spPr>
           <a:xfrm>
-            <a:off x="3542581" y="6429228"/>
-            <a:ext cx="4454874" cy="369332"/>
+            <a:off x="1328468" y="3692106"/>
+            <a:ext cx="9552317" cy="2308324"/>
           </a:xfrm>
           <a:prstGeom prst="rect">
             <a:avLst/>
@@ -4282,17 +4338,77 @@
           <a:noFill/>
         </p:spPr>
         <p:txBody>
-          <a:bodyPr wrap="none" rtlCol="0">
+          <a:bodyPr wrap="square" rtlCol="0">
             <a:spAutoFit/>
           </a:bodyPr>
           <a:lstStyle/>
           <a:p>
-            <a:r>
-              <a:rPr lang="en-US" dirty="0">
-                <a:hlinkClick r:id="rId3"/>
-              </a:rPr>
-              <a:t>https://leafletjs.com/examples/quick-start/</a:t>
-            </a:r>
+            <a:pPr marL="285750" indent="-285750">
+              <a:buFont typeface="Arial" panose="020B0604020202020204" pitchFamily="34" charset="0"/>
+              <a:buChar char="•"/>
+            </a:pPr>
+            <a:r>
+              <a:rPr lang="en-US" dirty="0"/>
+              <a:t>Multiple CSV files </a:t>
+            </a:r>
+          </a:p>
+          <a:p>
+            <a:pPr marL="285750" indent="-285750">
+              <a:buFont typeface="Arial" panose="020B0604020202020204" pitchFamily="34" charset="0"/>
+              <a:buChar char="•"/>
+            </a:pPr>
+            <a:endParaRPr lang="en-US" dirty="0"/>
+          </a:p>
+          <a:p>
+            <a:pPr marL="285750" indent="-285750">
+              <a:buFont typeface="Arial" panose="020B0604020202020204" pitchFamily="34" charset="0"/>
+              <a:buChar char="•"/>
+            </a:pPr>
+            <a:r>
+              <a:rPr lang="en-US" dirty="0"/>
+              <a:t>Some files had over 1 million rows of data</a:t>
+            </a:r>
+          </a:p>
+          <a:p>
+            <a:pPr marL="285750" indent="-285750">
+              <a:buFont typeface="Arial" panose="020B0604020202020204" pitchFamily="34" charset="0"/>
+              <a:buChar char="•"/>
+            </a:pPr>
+            <a:endParaRPr lang="en-US" dirty="0"/>
+          </a:p>
+          <a:p>
+            <a:pPr marL="285750" indent="-285750">
+              <a:buFont typeface="Arial" panose="020B0604020202020204" pitchFamily="34" charset="0"/>
+              <a:buChar char="•"/>
+            </a:pPr>
+            <a:r>
+              <a:rPr lang="en-US" dirty="0"/>
+              <a:t>Reduced to 11 </a:t>
+            </a:r>
+            <a:r>
+              <a:rPr lang="en-US" dirty="0" err="1"/>
+              <a:t>Aiports</a:t>
+            </a:r>
+            <a:endParaRPr lang="en-US" dirty="0"/>
+          </a:p>
+          <a:p>
+            <a:pPr marL="285750" indent="-285750">
+              <a:buFont typeface="Arial" panose="020B0604020202020204" pitchFamily="34" charset="0"/>
+              <a:buChar char="•"/>
+            </a:pPr>
+            <a:endParaRPr lang="en-US" dirty="0"/>
+          </a:p>
+          <a:p>
+            <a:pPr marL="285750" indent="-285750">
+              <a:buFont typeface="Arial" panose="020B0604020202020204" pitchFamily="34" charset="0"/>
+              <a:buChar char="•"/>
+            </a:pPr>
+            <a:r>
+              <a:rPr lang="en-US" dirty="0"/>
+              <a:t>Reduced to 5 Airlines</a:t>
+            </a:r>
+          </a:p>
+          <a:p>
             <a:endParaRPr lang="en-US" dirty="0"/>
           </a:p>
         </p:txBody>
@@ -4300,7 +4416,7 @@
     </p:spTree>
     <p:extLst>
       <p:ext uri="{BB962C8B-B14F-4D97-AF65-F5344CB8AC3E}">
-        <p14:creationId xmlns:p14="http://schemas.microsoft.com/office/powerpoint/2010/main" val="288489999"/>
+        <p14:creationId xmlns:p14="http://schemas.microsoft.com/office/powerpoint/2010/main" val="950101113"/>
       </p:ext>
     </p:extLst>
   </p:cSld>
@@ -4332,6 +4448,139 @@
           <p:cNvPr id="2" name="Title 1">
             <a:extLst>
               <a:ext uri="{FF2B5EF4-FFF2-40B4-BE49-F238E27FC236}">
+                <a16:creationId xmlns:a16="http://schemas.microsoft.com/office/drawing/2014/main" id="{EF12A194-F17B-4168-9418-35F4A913DD9B}"/>
+              </a:ext>
+            </a:extLst>
+          </p:cNvPr>
+          <p:cNvSpPr>
+            <a:spLocks noGrp="1"/>
+          </p:cNvSpPr>
+          <p:nvPr>
+            <p:ph type="title"/>
+          </p:nvPr>
+        </p:nvSpPr>
+        <p:spPr/>
+        <p:txBody>
+          <a:bodyPr/>
+          <a:lstStyle/>
+          <a:p>
+            <a:pPr algn="ctr"/>
+            <a:r>
+              <a:rPr lang="en-US" dirty="0"/>
+              <a:t>The Inspiration – Leaflet.js</a:t>
+            </a:r>
+          </a:p>
+        </p:txBody>
+      </p:sp>
+      <p:pic>
+        <p:nvPicPr>
+          <p:cNvPr id="4" name="Picture 3">
+            <a:extLst>
+              <a:ext uri="{FF2B5EF4-FFF2-40B4-BE49-F238E27FC236}">
+                <a16:creationId xmlns:a16="http://schemas.microsoft.com/office/drawing/2014/main" id="{B691D0C6-BF65-4436-B015-9F4D6898D57D}"/>
+              </a:ext>
+            </a:extLst>
+          </p:cNvPr>
+          <p:cNvPicPr>
+            <a:picLocks noChangeAspect="1"/>
+          </p:cNvPicPr>
+          <p:nvPr/>
+        </p:nvPicPr>
+        <p:blipFill>
+          <a:blip r:embed="rId2">
+            <a:extLst>
+              <a:ext uri="{28A0092B-C50C-407E-A947-70E740481C1C}">
+                <a14:useLocalDpi xmlns:a14="http://schemas.microsoft.com/office/drawing/2010/main" val="0"/>
+              </a:ext>
+            </a:extLst>
+          </a:blip>
+          <a:stretch>
+            <a:fillRect/>
+          </a:stretch>
+        </p:blipFill>
+        <p:spPr>
+          <a:xfrm>
+            <a:off x="2855346" y="2080614"/>
+            <a:ext cx="5829343" cy="3881466"/>
+          </a:xfrm>
+          <a:prstGeom prst="rect">
+            <a:avLst/>
+          </a:prstGeom>
+        </p:spPr>
+      </p:pic>
+      <p:sp>
+        <p:nvSpPr>
+          <p:cNvPr id="5" name="TextBox 4">
+            <a:extLst>
+              <a:ext uri="{FF2B5EF4-FFF2-40B4-BE49-F238E27FC236}">
+                <a16:creationId xmlns:a16="http://schemas.microsoft.com/office/drawing/2014/main" id="{AE50F071-4736-4B62-AB3A-53168A9054A4}"/>
+              </a:ext>
+            </a:extLst>
+          </p:cNvPr>
+          <p:cNvSpPr txBox="1"/>
+          <p:nvPr/>
+        </p:nvSpPr>
+        <p:spPr>
+          <a:xfrm>
+            <a:off x="3542581" y="6429228"/>
+            <a:ext cx="4454874" cy="369332"/>
+          </a:xfrm>
+          <a:prstGeom prst="rect">
+            <a:avLst/>
+          </a:prstGeom>
+          <a:noFill/>
+        </p:spPr>
+        <p:txBody>
+          <a:bodyPr wrap="none" rtlCol="0">
+            <a:spAutoFit/>
+          </a:bodyPr>
+          <a:lstStyle/>
+          <a:p>
+            <a:r>
+              <a:rPr lang="en-US" dirty="0">
+                <a:hlinkClick r:id="rId3"/>
+              </a:rPr>
+              <a:t>https://leafletjs.com/examples/quick-start/</a:t>
+            </a:r>
+            <a:endParaRPr lang="en-US" dirty="0"/>
+          </a:p>
+        </p:txBody>
+      </p:sp>
+    </p:spTree>
+    <p:extLst>
+      <p:ext uri="{BB962C8B-B14F-4D97-AF65-F5344CB8AC3E}">
+        <p14:creationId xmlns:p14="http://schemas.microsoft.com/office/powerpoint/2010/main" val="288489999"/>
+      </p:ext>
+    </p:extLst>
+  </p:cSld>
+  <p:clrMapOvr>
+    <a:masterClrMapping/>
+  </p:clrMapOvr>
+</p:sld>
+</file>
+
+<file path=ppt/slides/slide5.xml><?xml version="1.0" encoding="utf-8"?>
+<p:sld xmlns:a="http://schemas.openxmlformats.org/drawingml/2006/main" xmlns:r="http://schemas.openxmlformats.org/officeDocument/2006/relationships" xmlns:p="http://schemas.openxmlformats.org/presentationml/2006/main">
+  <p:cSld>
+    <p:spTree>
+      <p:nvGrpSpPr>
+        <p:cNvPr id="1" name=""/>
+        <p:cNvGrpSpPr/>
+        <p:nvPr/>
+      </p:nvGrpSpPr>
+      <p:grpSpPr>
+        <a:xfrm>
+          <a:off x="0" y="0"/>
+          <a:ext cx="0" cy="0"/>
+          <a:chOff x="0" y="0"/>
+          <a:chExt cx="0" cy="0"/>
+        </a:xfrm>
+      </p:grpSpPr>
+      <p:sp>
+        <p:nvSpPr>
+          <p:cNvPr id="2" name="Title 1">
+            <a:extLst>
+              <a:ext uri="{FF2B5EF4-FFF2-40B4-BE49-F238E27FC236}">
                 <a16:creationId xmlns:a16="http://schemas.microsoft.com/office/drawing/2014/main" id="{706D5EC1-E7F3-4706-ADA1-55338DD22206}"/>
               </a:ext>
             </a:extLst>
@@ -4351,7 +4600,7 @@
             <a:pPr algn="ctr"/>
             <a:r>
               <a:rPr lang="en-US" dirty="0"/>
-              <a:t>Our Inspiration - Leaflet.js</a:t>
+              <a:t>Our Idea - Leaflet.js</a:t>
             </a:r>
           </a:p>
         </p:txBody>
@@ -4420,8 +4669,9 @@
           </a:bodyPr>
           <a:lstStyle/>
           <a:p>
-            <a:pPr marL="0" indent="0">
-              <a:buNone/>
+            <a:pPr>
+              <a:buFont typeface="Arial" panose="020B0604020202020204" pitchFamily="34" charset="0"/>
+              <a:buChar char="•"/>
             </a:pPr>
             <a:r>
               <a:rPr lang="en-US" dirty="0"/>
@@ -4429,8 +4679,9 @@
             </a:r>
           </a:p>
           <a:p>
-            <a:pPr marL="0" indent="0">
-              <a:buNone/>
+            <a:pPr>
+              <a:buFont typeface="Arial" panose="020B0604020202020204" pitchFamily="34" charset="0"/>
+              <a:buChar char="•"/>
             </a:pPr>
             <a:r>
               <a:rPr lang="en-US" dirty="0"/>
@@ -4438,8 +4689,9 @@
             </a:r>
           </a:p>
           <a:p>
-            <a:pPr marL="0" indent="0">
-              <a:buNone/>
+            <a:pPr>
+              <a:buFont typeface="Arial" panose="020B0604020202020204" pitchFamily="34" charset="0"/>
+              <a:buChar char="•"/>
             </a:pPr>
             <a:r>
               <a:rPr lang="en-US" dirty="0"/>
@@ -4525,7 +4777,7 @@
 </p:sld>
 </file>
 
-<file path=ppt/slides/slide5.xml><?xml version="1.0" encoding="utf-8"?>
+<file path=ppt/slides/slide6.xml><?xml version="1.0" encoding="utf-8"?>
 <p:sld xmlns:a="http://schemas.openxmlformats.org/drawingml/2006/main" xmlns:r="http://schemas.openxmlformats.org/officeDocument/2006/relationships" xmlns:p="http://schemas.openxmlformats.org/presentationml/2006/main">
   <p:cSld>
     <p:spTree>
@@ -4547,6 +4799,139 @@
           <p:cNvPr id="2" name="Title 1">
             <a:extLst>
               <a:ext uri="{FF2B5EF4-FFF2-40B4-BE49-F238E27FC236}">
+                <a16:creationId xmlns:a16="http://schemas.microsoft.com/office/drawing/2014/main" id="{EF12A194-F17B-4168-9418-35F4A913DD9B}"/>
+              </a:ext>
+            </a:extLst>
+          </p:cNvPr>
+          <p:cNvSpPr>
+            <a:spLocks noGrp="1"/>
+          </p:cNvSpPr>
+          <p:nvPr>
+            <p:ph type="title"/>
+          </p:nvPr>
+        </p:nvSpPr>
+        <p:spPr/>
+        <p:txBody>
+          <a:bodyPr/>
+          <a:lstStyle/>
+          <a:p>
+            <a:pPr algn="ctr"/>
+            <a:r>
+              <a:rPr lang="en-US" dirty="0"/>
+              <a:t>The Inspiration – Leaflet.js</a:t>
+            </a:r>
+          </a:p>
+        </p:txBody>
+      </p:sp>
+      <p:sp>
+        <p:nvSpPr>
+          <p:cNvPr id="5" name="TextBox 4">
+            <a:extLst>
+              <a:ext uri="{FF2B5EF4-FFF2-40B4-BE49-F238E27FC236}">
+                <a16:creationId xmlns:a16="http://schemas.microsoft.com/office/drawing/2014/main" id="{AE50F071-4736-4B62-AB3A-53168A9054A4}"/>
+              </a:ext>
+            </a:extLst>
+          </p:cNvPr>
+          <p:cNvSpPr txBox="1"/>
+          <p:nvPr/>
+        </p:nvSpPr>
+        <p:spPr>
+          <a:xfrm>
+            <a:off x="3542581" y="6429228"/>
+            <a:ext cx="4454874" cy="369332"/>
+          </a:xfrm>
+          <a:prstGeom prst="rect">
+            <a:avLst/>
+          </a:prstGeom>
+          <a:noFill/>
+        </p:spPr>
+        <p:txBody>
+          <a:bodyPr wrap="none" rtlCol="0">
+            <a:spAutoFit/>
+          </a:bodyPr>
+          <a:lstStyle/>
+          <a:p>
+            <a:r>
+              <a:rPr lang="en-US" dirty="0">
+                <a:hlinkClick r:id="rId2"/>
+              </a:rPr>
+              <a:t>https://leafletjs.com/examples/quick-start/</a:t>
+            </a:r>
+            <a:endParaRPr lang="en-US" dirty="0"/>
+          </a:p>
+        </p:txBody>
+      </p:sp>
+      <p:pic>
+        <p:nvPicPr>
+          <p:cNvPr id="6" name="Picture 5">
+            <a:extLst>
+              <a:ext uri="{FF2B5EF4-FFF2-40B4-BE49-F238E27FC236}">
+                <a16:creationId xmlns:a16="http://schemas.microsoft.com/office/drawing/2014/main" id="{CA48B5B1-C7CF-4CBB-BADD-EA67741C7D8B}"/>
+              </a:ext>
+            </a:extLst>
+          </p:cNvPr>
+          <p:cNvPicPr>
+            <a:picLocks noChangeAspect="1"/>
+          </p:cNvPicPr>
+          <p:nvPr/>
+        </p:nvPicPr>
+        <p:blipFill>
+          <a:blip r:embed="rId3">
+            <a:extLst>
+              <a:ext uri="{28A0092B-C50C-407E-A947-70E740481C1C}">
+                <a14:useLocalDpi xmlns:a14="http://schemas.microsoft.com/office/drawing/2010/main" val="0"/>
+              </a:ext>
+            </a:extLst>
+          </a:blip>
+          <a:stretch>
+            <a:fillRect/>
+          </a:stretch>
+        </p:blipFill>
+        <p:spPr>
+          <a:xfrm>
+            <a:off x="1814391" y="2381424"/>
+            <a:ext cx="8563218" cy="2634836"/>
+          </a:xfrm>
+          <a:prstGeom prst="rect">
+            <a:avLst/>
+          </a:prstGeom>
+        </p:spPr>
+      </p:pic>
+    </p:spTree>
+    <p:extLst>
+      <p:ext uri="{BB962C8B-B14F-4D97-AF65-F5344CB8AC3E}">
+        <p14:creationId xmlns:p14="http://schemas.microsoft.com/office/powerpoint/2010/main" val="3780143646"/>
+      </p:ext>
+    </p:extLst>
+  </p:cSld>
+  <p:clrMapOvr>
+    <a:masterClrMapping/>
+  </p:clrMapOvr>
+</p:sld>
+</file>
+
+<file path=ppt/slides/slide7.xml><?xml version="1.0" encoding="utf-8"?>
+<p:sld xmlns:a="http://schemas.openxmlformats.org/drawingml/2006/main" xmlns:r="http://schemas.openxmlformats.org/officeDocument/2006/relationships" xmlns:p="http://schemas.openxmlformats.org/presentationml/2006/main">
+  <p:cSld>
+    <p:spTree>
+      <p:nvGrpSpPr>
+        <p:cNvPr id="1" name=""/>
+        <p:cNvGrpSpPr/>
+        <p:nvPr/>
+      </p:nvGrpSpPr>
+      <p:grpSpPr>
+        <a:xfrm>
+          <a:off x="0" y="0"/>
+          <a:ext cx="0" cy="0"/>
+          <a:chOff x="0" y="0"/>
+          <a:chExt cx="0" cy="0"/>
+        </a:xfrm>
+      </p:grpSpPr>
+      <p:sp>
+        <p:nvSpPr>
+          <p:cNvPr id="2" name="Title 1">
+            <a:extLst>
+              <a:ext uri="{FF2B5EF4-FFF2-40B4-BE49-F238E27FC236}">
                 <a16:creationId xmlns:a16="http://schemas.microsoft.com/office/drawing/2014/main" id="{706D5EC1-E7F3-4706-ADA1-55338DD22206}"/>
               </a:ext>
             </a:extLst>
@@ -4563,9 +4948,10 @@
           <a:bodyPr/>
           <a:lstStyle/>
           <a:p>
+            <a:pPr algn="ctr"/>
             <a:r>
               <a:rPr lang="en-US" dirty="0"/>
-              <a:t>The Inspiration pt. I – Leaflet.js</a:t>
+              <a:t>Our Idea – Cal heatmap</a:t>
             </a:r>
           </a:p>
         </p:txBody>
@@ -4596,49 +4982,33 @@
           <a:bodyPr/>
           <a:lstStyle/>
           <a:p>
-            <a:pPr marL="0" indent="0">
-              <a:buNone/>
+            <a:pPr>
+              <a:buFont typeface="Arial" panose="020B0604020202020204" pitchFamily="34" charset="0"/>
+              <a:buChar char="•"/>
             </a:pPr>
             <a:r>
               <a:rPr lang="en-US" dirty="0"/>
-              <a:t>Hover over -  date to show delayed time</a:t>
-            </a:r>
-          </a:p>
-          <a:p>
-            <a:pPr marL="0" indent="0">
-              <a:buNone/>
+              <a:t>Hover over  to show date and avg</a:t>
+            </a:r>
+          </a:p>
+          <a:p>
+            <a:pPr>
+              <a:buFont typeface="Arial" panose="020B0604020202020204" pitchFamily="34" charset="0"/>
+              <a:buChar char="•"/>
             </a:pPr>
             <a:r>
               <a:rPr lang="en-US" dirty="0"/>
-              <a:t>Use selector function to filter Airline</a:t>
-            </a:r>
-          </a:p>
-          <a:p>
-            <a:pPr lvl="1"/>
+              <a:t>Use selector function to filter delayed data per Airline</a:t>
+            </a:r>
+          </a:p>
+          <a:p>
+            <a:pPr>
+              <a:buFont typeface="Arial" panose="020B0604020202020204" pitchFamily="34" charset="0"/>
+              <a:buChar char="•"/>
+            </a:pPr>
             <a:r>
               <a:rPr lang="en-US" dirty="0"/>
-              <a:t>Full airport name</a:t>
-            </a:r>
-          </a:p>
-          <a:p>
-            <a:pPr lvl="1"/>
-            <a:r>
-              <a:rPr lang="en-US" dirty="0"/>
-              <a:t>City</a:t>
-            </a:r>
-          </a:p>
-          <a:p>
-            <a:pPr lvl="1"/>
-            <a:r>
-              <a:rPr lang="en-US" dirty="0"/>
-              <a:t>State (abbreviation)</a:t>
-            </a:r>
-          </a:p>
-          <a:p>
-            <a:pPr lvl="1"/>
-            <a:r>
-              <a:rPr lang="en-US" dirty="0"/>
-              <a:t>Population</a:t>
+              <a:t>Each shade to be scaled per range of relayed time</a:t>
             </a:r>
           </a:p>
         </p:txBody>
@@ -4658,7 +5028,7 @@
         <p:spPr>
           <a:xfrm>
             <a:off x="6292655" y="2120900"/>
-            <a:ext cx="6096000" cy="369332"/>
+            <a:ext cx="6096000" cy="830997"/>
           </a:xfrm>
           <a:prstGeom prst="rect">
             <a:avLst/>
@@ -4671,8 +5041,8 @@
           <a:lstStyle/>
           <a:p>
             <a:r>
-              <a:rPr lang="en-US" dirty="0"/>
-              <a:t>Show delayed time per date</a:t>
+              <a:rPr lang="en-US" sz="2400" b="1" dirty="0"/>
+              <a:t>Vertical Calendar Heatmap – Shows delay data from data</a:t>
             </a:r>
           </a:p>
         </p:txBody>
@@ -4724,10 +5094,10 @@
       </p:sp>
       <p:pic>
         <p:nvPicPr>
-          <p:cNvPr id="9" name="Picture 8">
-            <a:extLst>
-              <a:ext uri="{FF2B5EF4-FFF2-40B4-BE49-F238E27FC236}">
-                <a16:creationId xmlns:a16="http://schemas.microsoft.com/office/drawing/2014/main" id="{72C35EC8-5B72-462A-B7B2-E208735E2EC1}"/>
+          <p:cNvPr id="6" name="Picture 5">
+            <a:extLst>
+              <a:ext uri="{FF2B5EF4-FFF2-40B4-BE49-F238E27FC236}">
+                <a16:creationId xmlns:a16="http://schemas.microsoft.com/office/drawing/2014/main" id="{035F7544-6439-41E3-9AAD-15AF9B276FC5}"/>
               </a:ext>
             </a:extLst>
           </p:cNvPr>
@@ -4750,8 +5120,8 @@
         </p:blipFill>
         <p:spPr>
           <a:xfrm>
-            <a:off x="701552" y="3025529"/>
-            <a:ext cx="5014949" cy="1543061"/>
+            <a:off x="311649" y="2291036"/>
+            <a:ext cx="5856749" cy="3091847"/>
           </a:xfrm>
           <a:prstGeom prst="rect">
             <a:avLst/>
@@ -4771,7 +5141,7 @@
 </p:sld>
 </file>
 
-<file path=ppt/slides/slide6.xml><?xml version="1.0" encoding="utf-8"?>
+<file path=ppt/slides/slide8.xml><?xml version="1.0" encoding="utf-8"?>
 <p:sld xmlns:a="http://schemas.openxmlformats.org/drawingml/2006/main" xmlns:r="http://schemas.openxmlformats.org/officeDocument/2006/relationships" xmlns:p="http://schemas.openxmlformats.org/presentationml/2006/main">
   <p:cSld>
     <p:spTree>
@@ -4809,9 +5179,10 @@
           <a:bodyPr/>
           <a:lstStyle/>
           <a:p>
+            <a:pPr algn="ctr"/>
             <a:r>
               <a:rPr lang="en-US" dirty="0"/>
-              <a:t>The Inspiration pt. II </a:t>
+              <a:t>The Project Outcome</a:t>
             </a:r>
           </a:p>
         </p:txBody>
@@ -4929,7 +5300,7 @@
 </p:sld>
 </file>
 
-<file path=ppt/slides/slide7.xml><?xml version="1.0" encoding="utf-8"?>
+<file path=ppt/slides/slide9.xml><?xml version="1.0" encoding="utf-8"?>
 <p:sld xmlns:a="http://schemas.openxmlformats.org/drawingml/2006/main" xmlns:r="http://schemas.openxmlformats.org/officeDocument/2006/relationships" xmlns:p="http://schemas.openxmlformats.org/presentationml/2006/main">
   <p:cSld>
     <p:spTree>

</xml_diff>